<commit_message>
Atualização das aulas de lógica de programação
</commit_message>
<xml_diff>
--- a/LingProgProc.pptx
+++ b/LingProgProc.pptx
@@ -105,6 +105,22 @@
       </a:defRPr>
     </a:lvl9pPr>
   </p:defaultTextStyle>
+  <p:extLst>
+    <p:ext uri="{EFAFB233-063F-42B5-8137-9DF3F51BA10A}">
+      <p15:sldGuideLst xmlns:p15="http://schemas.microsoft.com/office/powerpoint/2012/main">
+        <p15:guide id="1" orient="horz" pos="2160">
+          <p15:clr>
+            <a:srgbClr val="A4A3A4"/>
+          </p15:clr>
+        </p15:guide>
+        <p15:guide id="2" pos="2880">
+          <p15:clr>
+            <a:srgbClr val="A4A3A4"/>
+          </p15:clr>
+        </p15:guide>
+      </p15:sldGuideLst>
+    </p:ext>
+  </p:extLst>
 </p:presentation>
 </file>
 
@@ -290,7 +306,7 @@
             <a:fld id="{2E700DB3-DBF0-4086-B675-117E7A9610B8}" type="datetimeFigureOut">
               <a:rPr lang="pt-BR" smtClean="0"/>
               <a:pPr/>
-              <a:t>12/08/2019</a:t>
+              <a:t>03/10/2019</a:t>
             </a:fld>
             <a:endParaRPr lang="pt-BR"/>
           </a:p>
@@ -457,7 +473,7 @@
             <a:fld id="{2E700DB3-DBF0-4086-B675-117E7A9610B8}" type="datetimeFigureOut">
               <a:rPr lang="pt-BR" smtClean="0"/>
               <a:pPr/>
-              <a:t>12/08/2019</a:t>
+              <a:t>03/10/2019</a:t>
             </a:fld>
             <a:endParaRPr lang="pt-BR"/>
           </a:p>
@@ -634,7 +650,7 @@
             <a:fld id="{2E700DB3-DBF0-4086-B675-117E7A9610B8}" type="datetimeFigureOut">
               <a:rPr lang="pt-BR" smtClean="0"/>
               <a:pPr/>
-              <a:t>12/08/2019</a:t>
+              <a:t>03/10/2019</a:t>
             </a:fld>
             <a:endParaRPr lang="pt-BR"/>
           </a:p>
@@ -801,7 +817,7 @@
             <a:fld id="{2E700DB3-DBF0-4086-B675-117E7A9610B8}" type="datetimeFigureOut">
               <a:rPr lang="pt-BR" smtClean="0"/>
               <a:pPr/>
-              <a:t>12/08/2019</a:t>
+              <a:t>03/10/2019</a:t>
             </a:fld>
             <a:endParaRPr lang="pt-BR"/>
           </a:p>
@@ -1044,7 +1060,7 @@
             <a:fld id="{2E700DB3-DBF0-4086-B675-117E7A9610B8}" type="datetimeFigureOut">
               <a:rPr lang="pt-BR" smtClean="0"/>
               <a:pPr/>
-              <a:t>12/08/2019</a:t>
+              <a:t>03/10/2019</a:t>
             </a:fld>
             <a:endParaRPr lang="pt-BR"/>
           </a:p>
@@ -1329,7 +1345,7 @@
             <a:fld id="{2E700DB3-DBF0-4086-B675-117E7A9610B8}" type="datetimeFigureOut">
               <a:rPr lang="pt-BR" smtClean="0"/>
               <a:pPr/>
-              <a:t>12/08/2019</a:t>
+              <a:t>03/10/2019</a:t>
             </a:fld>
             <a:endParaRPr lang="pt-BR"/>
           </a:p>
@@ -1748,7 +1764,7 @@
             <a:fld id="{2E700DB3-DBF0-4086-B675-117E7A9610B8}" type="datetimeFigureOut">
               <a:rPr lang="pt-BR" smtClean="0"/>
               <a:pPr/>
-              <a:t>12/08/2019</a:t>
+              <a:t>03/10/2019</a:t>
             </a:fld>
             <a:endParaRPr lang="pt-BR"/>
           </a:p>
@@ -1863,7 +1879,7 @@
             <a:fld id="{2E700DB3-DBF0-4086-B675-117E7A9610B8}" type="datetimeFigureOut">
               <a:rPr lang="pt-BR" smtClean="0"/>
               <a:pPr/>
-              <a:t>12/08/2019</a:t>
+              <a:t>03/10/2019</a:t>
             </a:fld>
             <a:endParaRPr lang="pt-BR"/>
           </a:p>
@@ -1955,7 +1971,7 @@
             <a:fld id="{2E700DB3-DBF0-4086-B675-117E7A9610B8}" type="datetimeFigureOut">
               <a:rPr lang="pt-BR" smtClean="0"/>
               <a:pPr/>
-              <a:t>12/08/2019</a:t>
+              <a:t>03/10/2019</a:t>
             </a:fld>
             <a:endParaRPr lang="pt-BR"/>
           </a:p>
@@ -2229,7 +2245,7 @@
             <a:fld id="{2E700DB3-DBF0-4086-B675-117E7A9610B8}" type="datetimeFigureOut">
               <a:rPr lang="pt-BR" smtClean="0"/>
               <a:pPr/>
-              <a:t>12/08/2019</a:t>
+              <a:t>03/10/2019</a:t>
             </a:fld>
             <a:endParaRPr lang="pt-BR"/>
           </a:p>
@@ -2479,7 +2495,7 @@
             <a:fld id="{2E700DB3-DBF0-4086-B675-117E7A9610B8}" type="datetimeFigureOut">
               <a:rPr lang="pt-BR" smtClean="0"/>
               <a:pPr/>
-              <a:t>12/08/2019</a:t>
+              <a:t>03/10/2019</a:t>
             </a:fld>
             <a:endParaRPr lang="pt-BR"/>
           </a:p>
@@ -2689,7 +2705,7 @@
             <a:fld id="{2E700DB3-DBF0-4086-B675-117E7A9610B8}" type="datetimeFigureOut">
               <a:rPr lang="pt-BR" smtClean="0"/>
               <a:pPr/>
-              <a:t>12/08/2019</a:t>
+              <a:t>03/10/2019</a:t>
             </a:fld>
             <a:endParaRPr lang="pt-BR"/>
           </a:p>
@@ -3076,20 +3092,32 @@
           <a:lstStyle/>
           <a:p>
             <a:r>
+              <a:rPr lang="en-GB" dirty="0" err="1"/>
+              <a:t>Programação</a:t>
+            </a:r>
+            <a:r>
+              <a:rPr lang="en-GB" dirty="0"/>
+              <a:t> </a:t>
+            </a:r>
+            <a:r>
+              <a:rPr lang="en-GB" dirty="0" err="1" smtClean="0"/>
+              <a:t>em</a:t>
+            </a:r>
+            <a:r>
+              <a:rPr lang="en-GB" dirty="0" smtClean="0"/>
+              <a:t> </a:t>
+            </a:r>
+            <a:r>
               <a:rPr lang="en-GB" dirty="0" err="1" smtClean="0"/>
               <a:t>Linguagem</a:t>
             </a:r>
             <a:r>
+              <a:rPr lang="en-GB" dirty="0"/>
+              <a:t> </a:t>
+            </a:r>
+            <a:r>
               <a:rPr lang="en-GB" dirty="0" smtClean="0"/>
-              <a:t> de </a:t>
-            </a:r>
-            <a:r>
-              <a:rPr lang="en-GB" dirty="0" err="1" smtClean="0"/>
-              <a:t>Programação</a:t>
-            </a:r>
-            <a:r>
-              <a:rPr lang="en-GB" dirty="0" smtClean="0"/>
-              <a:t> Procedural</a:t>
+              <a:t>Procedural</a:t>
             </a:r>
             <a:endParaRPr lang="en-GB" dirty="0"/>
           </a:p>

</xml_diff>